<commit_message>
Remove object files, add video, link to src examples
</commit_message>
<xml_diff>
--- a/static/lectures/lecture04-calling-conventions/lecture04-calling-conventions.pptx
+++ b/static/lectures/lecture04-calling-conventions/lecture04-calling-conventions.pptx
@@ -9,10 +9,10 @@
     <p:sldMasterId id="2147483696" r:id="rId5"/>
   </p:sldMasterIdLst>
   <p:notesMasterIdLst>
-    <p:notesMasterId r:id="rId69"/>
+    <p:notesMasterId r:id="rId70"/>
   </p:notesMasterIdLst>
   <p:handoutMasterIdLst>
-    <p:handoutMasterId r:id="rId70"/>
+    <p:handoutMasterId r:id="rId71"/>
   </p:handoutMasterIdLst>
   <p:sldIdLst>
     <p:sldId id="256" r:id="rId6"/>
@@ -71,13 +71,14 @@
     <p:sldId id="310" r:id="rId59"/>
     <p:sldId id="311" r:id="rId60"/>
     <p:sldId id="312" r:id="rId61"/>
-    <p:sldId id="313" r:id="rId62"/>
-    <p:sldId id="314" r:id="rId63"/>
-    <p:sldId id="315" r:id="rId64"/>
-    <p:sldId id="316" r:id="rId65"/>
-    <p:sldId id="317" r:id="rId66"/>
-    <p:sldId id="318" r:id="rId67"/>
-    <p:sldId id="319" r:id="rId68"/>
+    <p:sldId id="446" r:id="rId62"/>
+    <p:sldId id="313" r:id="rId63"/>
+    <p:sldId id="314" r:id="rId64"/>
+    <p:sldId id="315" r:id="rId65"/>
+    <p:sldId id="316" r:id="rId66"/>
+    <p:sldId id="317" r:id="rId67"/>
+    <p:sldId id="318" r:id="rId68"/>
+    <p:sldId id="319" r:id="rId69"/>
   </p:sldIdLst>
   <p:sldSz cx="10080625" cy="7559675"/>
   <p:notesSz cx="7772400" cy="10058400"/>
@@ -6964,7 +6965,13 @@
   <p:cSld>
     <p:spTree>
       <p:nvGrpSpPr>
-        <p:cNvPr id="1" name=""/>
+        <p:cNvPr id="1" name="">
+          <a:extLst>
+            <a:ext uri="{FF2B5EF4-FFF2-40B4-BE49-F238E27FC236}">
+              <a16:creationId xmlns:a16="http://schemas.microsoft.com/office/drawing/2014/main" id="{D024B749-74A4-139A-0214-294DA1CA2924}"/>
+            </a:ext>
+          </a:extLst>
+        </p:cNvPr>
         <p:cNvGrpSpPr/>
         <p:nvPr/>
       </p:nvGrpSpPr>
@@ -6981,7 +6988,7 @@
           <p:cNvPr id="7" name="Slide Number Placeholder 6">
             <a:extLst>
               <a:ext uri="{FF2B5EF4-FFF2-40B4-BE49-F238E27FC236}">
-                <a16:creationId xmlns:a16="http://schemas.microsoft.com/office/drawing/2014/main" id="{DDA62B5D-4E33-3188-3890-DA409315462B}"/>
+                <a16:creationId xmlns:a16="http://schemas.microsoft.com/office/drawing/2014/main" id="{FB2E95BA-E3F9-C939-227B-FD72E5B64877}"/>
               </a:ext>
             </a:extLst>
           </p:cNvPr>
@@ -7002,7 +7009,7 @@
           <a:lstStyle/>
           <a:p>
             <a:pPr lvl="0"/>
-            <a:fld id="{96B24497-728D-DF42-80D8-0566160AC1E3}" type="slidenum">
+            <a:fld id="{FDA4B4B5-6CC4-0D46-BA94-EFFB7805E336}" type="slidenum">
               <a:t>57</a:t>
             </a:fld>
             <a:endParaRPr lang="en-US"/>
@@ -7014,7 +7021,7 @@
           <p:cNvPr id="2" name="Slide Image Placeholder 1">
             <a:extLst>
               <a:ext uri="{FF2B5EF4-FFF2-40B4-BE49-F238E27FC236}">
-                <a16:creationId xmlns:a16="http://schemas.microsoft.com/office/drawing/2014/main" id="{453AC3B0-4F12-01C8-AE20-209ED1AEA798}"/>
+                <a16:creationId xmlns:a16="http://schemas.microsoft.com/office/drawing/2014/main" id="{724D4C3F-9994-0C81-D697-340F19E72CAB}"/>
               </a:ext>
             </a:extLst>
           </p:cNvPr>
@@ -7046,7 +7053,7 @@
           <p:cNvPr id="3" name="Notes Placeholder 2">
             <a:extLst>
               <a:ext uri="{FF2B5EF4-FFF2-40B4-BE49-F238E27FC236}">
-                <a16:creationId xmlns:a16="http://schemas.microsoft.com/office/drawing/2014/main" id="{064BB9C5-9398-D2CF-04C7-0F6BCC006DBA}"/>
+                <a16:creationId xmlns:a16="http://schemas.microsoft.com/office/drawing/2014/main" id="{77A3AC4E-ACCE-C8D3-1327-5F5A0BC08188}"/>
               </a:ext>
             </a:extLst>
           </p:cNvPr>
@@ -7067,6 +7074,11 @@
         </p:txBody>
       </p:sp>
     </p:spTree>
+    <p:extLst>
+      <p:ext uri="{BB962C8B-B14F-4D97-AF65-F5344CB8AC3E}">
+        <p14:creationId xmlns:p14="http://schemas.microsoft.com/office/powerpoint/2010/main" val="2773385350"/>
+      </p:ext>
+    </p:extLst>
   </p:cSld>
   <p:clrMapOvr>
     <a:masterClrMapping/>
@@ -7096,7 +7108,7 @@
           <p:cNvPr id="7" name="Slide Number Placeholder 6">
             <a:extLst>
               <a:ext uri="{FF2B5EF4-FFF2-40B4-BE49-F238E27FC236}">
-                <a16:creationId xmlns:a16="http://schemas.microsoft.com/office/drawing/2014/main" id="{CB794CB8-247B-24E5-DE82-E97CE9E44D45}"/>
+                <a16:creationId xmlns:a16="http://schemas.microsoft.com/office/drawing/2014/main" id="{DDA62B5D-4E33-3188-3890-DA409315462B}"/>
               </a:ext>
             </a:extLst>
           </p:cNvPr>
@@ -7117,7 +7129,7 @@
           <a:lstStyle/>
           <a:p>
             <a:pPr lvl="0"/>
-            <a:fld id="{3C059742-795A-7D4C-8BB4-08EDE3E536AE}" type="slidenum">
+            <a:fld id="{96B24497-728D-DF42-80D8-0566160AC1E3}" type="slidenum">
               <a:t>58</a:t>
             </a:fld>
             <a:endParaRPr lang="en-US"/>
@@ -7129,7 +7141,7 @@
           <p:cNvPr id="2" name="Slide Image Placeholder 1">
             <a:extLst>
               <a:ext uri="{FF2B5EF4-FFF2-40B4-BE49-F238E27FC236}">
-                <a16:creationId xmlns:a16="http://schemas.microsoft.com/office/drawing/2014/main" id="{0B26E435-B07E-8ED2-BE37-C8A310E073C6}"/>
+                <a16:creationId xmlns:a16="http://schemas.microsoft.com/office/drawing/2014/main" id="{453AC3B0-4F12-01C8-AE20-209ED1AEA798}"/>
               </a:ext>
             </a:extLst>
           </p:cNvPr>
@@ -7161,7 +7173,7 @@
           <p:cNvPr id="3" name="Notes Placeholder 2">
             <a:extLst>
               <a:ext uri="{FF2B5EF4-FFF2-40B4-BE49-F238E27FC236}">
-                <a16:creationId xmlns:a16="http://schemas.microsoft.com/office/drawing/2014/main" id="{6D380093-759F-88A0-03B7-3883C3D12D06}"/>
+                <a16:creationId xmlns:a16="http://schemas.microsoft.com/office/drawing/2014/main" id="{064BB9C5-9398-D2CF-04C7-0F6BCC006DBA}"/>
               </a:ext>
             </a:extLst>
           </p:cNvPr>
@@ -7211,7 +7223,7 @@
           <p:cNvPr id="7" name="Slide Number Placeholder 6">
             <a:extLst>
               <a:ext uri="{FF2B5EF4-FFF2-40B4-BE49-F238E27FC236}">
-                <a16:creationId xmlns:a16="http://schemas.microsoft.com/office/drawing/2014/main" id="{5036FB9B-E431-5A71-0845-DDF74F154FEE}"/>
+                <a16:creationId xmlns:a16="http://schemas.microsoft.com/office/drawing/2014/main" id="{CB794CB8-247B-24E5-DE82-E97CE9E44D45}"/>
               </a:ext>
             </a:extLst>
           </p:cNvPr>
@@ -7232,7 +7244,7 @@
           <a:lstStyle/>
           <a:p>
             <a:pPr lvl="0"/>
-            <a:fld id="{3E6444F6-1111-A343-A50C-E482FC262B3A}" type="slidenum">
+            <a:fld id="{3C059742-795A-7D4C-8BB4-08EDE3E536AE}" type="slidenum">
               <a:t>59</a:t>
             </a:fld>
             <a:endParaRPr lang="en-US"/>
@@ -7244,7 +7256,7 @@
           <p:cNvPr id="2" name="Slide Image Placeholder 1">
             <a:extLst>
               <a:ext uri="{FF2B5EF4-FFF2-40B4-BE49-F238E27FC236}">
-                <a16:creationId xmlns:a16="http://schemas.microsoft.com/office/drawing/2014/main" id="{2079AFFB-2B37-2490-1C9E-4BCAEC8B78E0}"/>
+                <a16:creationId xmlns:a16="http://schemas.microsoft.com/office/drawing/2014/main" id="{0B26E435-B07E-8ED2-BE37-C8A310E073C6}"/>
               </a:ext>
             </a:extLst>
           </p:cNvPr>
@@ -7276,7 +7288,7 @@
           <p:cNvPr id="3" name="Notes Placeholder 2">
             <a:extLst>
               <a:ext uri="{FF2B5EF4-FFF2-40B4-BE49-F238E27FC236}">
-                <a16:creationId xmlns:a16="http://schemas.microsoft.com/office/drawing/2014/main" id="{9798314A-916C-4CD0-E954-1F4CEC9B5F1F}"/>
+                <a16:creationId xmlns:a16="http://schemas.microsoft.com/office/drawing/2014/main" id="{6D380093-759F-88A0-03B7-3883C3D12D06}"/>
               </a:ext>
             </a:extLst>
           </p:cNvPr>
@@ -7441,7 +7453,7 @@
           <p:cNvPr id="7" name="Slide Number Placeholder 6">
             <a:extLst>
               <a:ext uri="{FF2B5EF4-FFF2-40B4-BE49-F238E27FC236}">
-                <a16:creationId xmlns:a16="http://schemas.microsoft.com/office/drawing/2014/main" id="{A38C040F-A737-4595-2300-7EEC726D6CB0}"/>
+                <a16:creationId xmlns:a16="http://schemas.microsoft.com/office/drawing/2014/main" id="{5036FB9B-E431-5A71-0845-DDF74F154FEE}"/>
               </a:ext>
             </a:extLst>
           </p:cNvPr>
@@ -7462,7 +7474,7 @@
           <a:lstStyle/>
           <a:p>
             <a:pPr lvl="0"/>
-            <a:fld id="{4F59AC98-6880-E046-882F-60DCCF89B0BF}" type="slidenum">
+            <a:fld id="{3E6444F6-1111-A343-A50C-E482FC262B3A}" type="slidenum">
               <a:t>60</a:t>
             </a:fld>
             <a:endParaRPr lang="en-US"/>
@@ -7474,7 +7486,7 @@
           <p:cNvPr id="2" name="Slide Image Placeholder 1">
             <a:extLst>
               <a:ext uri="{FF2B5EF4-FFF2-40B4-BE49-F238E27FC236}">
-                <a16:creationId xmlns:a16="http://schemas.microsoft.com/office/drawing/2014/main" id="{C53FE332-4EDD-5AE4-8D92-F7EF2301F7BE}"/>
+                <a16:creationId xmlns:a16="http://schemas.microsoft.com/office/drawing/2014/main" id="{2079AFFB-2B37-2490-1C9E-4BCAEC8B78E0}"/>
               </a:ext>
             </a:extLst>
           </p:cNvPr>
@@ -7506,7 +7518,7 @@
           <p:cNvPr id="3" name="Notes Placeholder 2">
             <a:extLst>
               <a:ext uri="{FF2B5EF4-FFF2-40B4-BE49-F238E27FC236}">
-                <a16:creationId xmlns:a16="http://schemas.microsoft.com/office/drawing/2014/main" id="{FFFCA37C-CB55-C57E-F2C8-30E69A9D5A38}"/>
+                <a16:creationId xmlns:a16="http://schemas.microsoft.com/office/drawing/2014/main" id="{9798314A-916C-4CD0-E954-1F4CEC9B5F1F}"/>
               </a:ext>
             </a:extLst>
           </p:cNvPr>
@@ -7556,7 +7568,7 @@
           <p:cNvPr id="7" name="Slide Number Placeholder 6">
             <a:extLst>
               <a:ext uri="{FF2B5EF4-FFF2-40B4-BE49-F238E27FC236}">
-                <a16:creationId xmlns:a16="http://schemas.microsoft.com/office/drawing/2014/main" id="{15DFF507-2464-E19A-A4CB-A84BDD13D43C}"/>
+                <a16:creationId xmlns:a16="http://schemas.microsoft.com/office/drawing/2014/main" id="{A38C040F-A737-4595-2300-7EEC726D6CB0}"/>
               </a:ext>
             </a:extLst>
           </p:cNvPr>
@@ -7577,7 +7589,7 @@
           <a:lstStyle/>
           <a:p>
             <a:pPr lvl="0"/>
-            <a:fld id="{9C8E48AA-FF02-9241-8184-07537F39E279}" type="slidenum">
+            <a:fld id="{4F59AC98-6880-E046-882F-60DCCF89B0BF}" type="slidenum">
               <a:t>61</a:t>
             </a:fld>
             <a:endParaRPr lang="en-US"/>
@@ -7589,7 +7601,7 @@
           <p:cNvPr id="2" name="Slide Image Placeholder 1">
             <a:extLst>
               <a:ext uri="{FF2B5EF4-FFF2-40B4-BE49-F238E27FC236}">
-                <a16:creationId xmlns:a16="http://schemas.microsoft.com/office/drawing/2014/main" id="{48908ACD-BF7A-1E6C-6E2C-D1C0D1386FC0}"/>
+                <a16:creationId xmlns:a16="http://schemas.microsoft.com/office/drawing/2014/main" id="{C53FE332-4EDD-5AE4-8D92-F7EF2301F7BE}"/>
               </a:ext>
             </a:extLst>
           </p:cNvPr>
@@ -7621,7 +7633,7 @@
           <p:cNvPr id="3" name="Notes Placeholder 2">
             <a:extLst>
               <a:ext uri="{FF2B5EF4-FFF2-40B4-BE49-F238E27FC236}">
-                <a16:creationId xmlns:a16="http://schemas.microsoft.com/office/drawing/2014/main" id="{28CC25FC-0AFA-24D2-2602-705EBC4D7AB1}"/>
+                <a16:creationId xmlns:a16="http://schemas.microsoft.com/office/drawing/2014/main" id="{FFFCA37C-CB55-C57E-F2C8-30E69A9D5A38}"/>
               </a:ext>
             </a:extLst>
           </p:cNvPr>
@@ -7671,7 +7683,7 @@
           <p:cNvPr id="7" name="Slide Number Placeholder 6">
             <a:extLst>
               <a:ext uri="{FF2B5EF4-FFF2-40B4-BE49-F238E27FC236}">
-                <a16:creationId xmlns:a16="http://schemas.microsoft.com/office/drawing/2014/main" id="{FC26D4DB-658C-F8B9-0EE9-98465D7B2D01}"/>
+                <a16:creationId xmlns:a16="http://schemas.microsoft.com/office/drawing/2014/main" id="{15DFF507-2464-E19A-A4CB-A84BDD13D43C}"/>
               </a:ext>
             </a:extLst>
           </p:cNvPr>
@@ -7692,7 +7704,7 @@
           <a:lstStyle/>
           <a:p>
             <a:pPr lvl="0"/>
-            <a:fld id="{58C9B07C-F2CC-0F48-9212-1F299C6B9494}" type="slidenum">
+            <a:fld id="{9C8E48AA-FF02-9241-8184-07537F39E279}" type="slidenum">
               <a:t>62</a:t>
             </a:fld>
             <a:endParaRPr lang="en-US"/>
@@ -7704,7 +7716,7 @@
           <p:cNvPr id="2" name="Slide Image Placeholder 1">
             <a:extLst>
               <a:ext uri="{FF2B5EF4-FFF2-40B4-BE49-F238E27FC236}">
-                <a16:creationId xmlns:a16="http://schemas.microsoft.com/office/drawing/2014/main" id="{A75B996A-3FEB-E3CD-25EA-01E2BA34FEC0}"/>
+                <a16:creationId xmlns:a16="http://schemas.microsoft.com/office/drawing/2014/main" id="{48908ACD-BF7A-1E6C-6E2C-D1C0D1386FC0}"/>
               </a:ext>
             </a:extLst>
           </p:cNvPr>
@@ -7736,7 +7748,7 @@
           <p:cNvPr id="3" name="Notes Placeholder 2">
             <a:extLst>
               <a:ext uri="{FF2B5EF4-FFF2-40B4-BE49-F238E27FC236}">
-                <a16:creationId xmlns:a16="http://schemas.microsoft.com/office/drawing/2014/main" id="{7C4E5482-8C4B-38E9-6C15-97BCB764AA97}"/>
+                <a16:creationId xmlns:a16="http://schemas.microsoft.com/office/drawing/2014/main" id="{28CC25FC-0AFA-24D2-2602-705EBC4D7AB1}"/>
               </a:ext>
             </a:extLst>
           </p:cNvPr>
@@ -7786,7 +7798,7 @@
           <p:cNvPr id="7" name="Slide Number Placeholder 6">
             <a:extLst>
               <a:ext uri="{FF2B5EF4-FFF2-40B4-BE49-F238E27FC236}">
-                <a16:creationId xmlns:a16="http://schemas.microsoft.com/office/drawing/2014/main" id="{8CDD7F67-F19B-12E5-4B54-81E87DE34CD5}"/>
+                <a16:creationId xmlns:a16="http://schemas.microsoft.com/office/drawing/2014/main" id="{FC26D4DB-658C-F8B9-0EE9-98465D7B2D01}"/>
               </a:ext>
             </a:extLst>
           </p:cNvPr>
@@ -7807,8 +7819,123 @@
           <a:lstStyle/>
           <a:p>
             <a:pPr lvl="0"/>
+            <a:fld id="{58C9B07C-F2CC-0F48-9212-1F299C6B9494}" type="slidenum">
+              <a:t>63</a:t>
+            </a:fld>
+            <a:endParaRPr lang="en-US"/>
+          </a:p>
+        </p:txBody>
+      </p:sp>
+      <p:sp>
+        <p:nvSpPr>
+          <p:cNvPr id="2" name="Slide Image Placeholder 1">
+            <a:extLst>
+              <a:ext uri="{FF2B5EF4-FFF2-40B4-BE49-F238E27FC236}">
+                <a16:creationId xmlns:a16="http://schemas.microsoft.com/office/drawing/2014/main" id="{A75B996A-3FEB-E3CD-25EA-01E2BA34FEC0}"/>
+              </a:ext>
+            </a:extLst>
+          </p:cNvPr>
+          <p:cNvSpPr>
+            <a:spLocks noGrp="1" noRot="1" noChangeAspect="1" noResize="1"/>
+          </p:cNvSpPr>
+          <p:nvPr>
+            <p:ph type="sldImg"/>
+          </p:nvPr>
+        </p:nvSpPr>
+        <p:spPr>
+          <a:xfrm>
+            <a:off x="1371600" y="763588"/>
+            <a:ext cx="5029200" cy="3771900"/>
+          </a:xfrm>
+          <a:solidFill>
+            <a:srgbClr val="99CCFF"/>
+          </a:solidFill>
+          <a:ln w="25400">
+            <a:solidFill>
+              <a:srgbClr val="000000"/>
+            </a:solidFill>
+            <a:prstDash val="solid"/>
+          </a:ln>
+        </p:spPr>
+      </p:sp>
+      <p:sp>
+        <p:nvSpPr>
+          <p:cNvPr id="3" name="Notes Placeholder 2">
+            <a:extLst>
+              <a:ext uri="{FF2B5EF4-FFF2-40B4-BE49-F238E27FC236}">
+                <a16:creationId xmlns:a16="http://schemas.microsoft.com/office/drawing/2014/main" id="{7C4E5482-8C4B-38E9-6C15-97BCB764AA97}"/>
+              </a:ext>
+            </a:extLst>
+          </p:cNvPr>
+          <p:cNvSpPr txBox="1">
+            <a:spLocks noGrp="1"/>
+          </p:cNvSpPr>
+          <p:nvPr>
+            <p:ph type="body" sz="quarter" idx="1"/>
+          </p:nvPr>
+        </p:nvSpPr>
+        <p:spPr/>
+        <p:txBody>
+          <a:bodyPr/>
+          <a:lstStyle/>
+          <a:p>
+            <a:endParaRPr lang="en-US"/>
+          </a:p>
+        </p:txBody>
+      </p:sp>
+    </p:spTree>
+  </p:cSld>
+  <p:clrMapOvr>
+    <a:masterClrMapping/>
+  </p:clrMapOvr>
+</p:notes>
+</file>
+
+<file path=ppt/notesSlides/notesSlide64.xml><?xml version="1.0" encoding="utf-8"?>
+<p:notes xmlns:a="http://schemas.openxmlformats.org/drawingml/2006/main" xmlns:r="http://schemas.openxmlformats.org/officeDocument/2006/relationships" xmlns:p="http://schemas.openxmlformats.org/presentationml/2006/main">
+  <p:cSld>
+    <p:spTree>
+      <p:nvGrpSpPr>
+        <p:cNvPr id="1" name=""/>
+        <p:cNvGrpSpPr/>
+        <p:nvPr/>
+      </p:nvGrpSpPr>
+      <p:grpSpPr>
+        <a:xfrm>
+          <a:off x="0" y="0"/>
+          <a:ext cx="0" cy="0"/>
+          <a:chOff x="0" y="0"/>
+          <a:chExt cx="0" cy="0"/>
+        </a:xfrm>
+      </p:grpSpPr>
+      <p:sp>
+        <p:nvSpPr>
+          <p:cNvPr id="7" name="Slide Number Placeholder 6">
+            <a:extLst>
+              <a:ext uri="{FF2B5EF4-FFF2-40B4-BE49-F238E27FC236}">
+                <a16:creationId xmlns:a16="http://schemas.microsoft.com/office/drawing/2014/main" id="{8CDD7F67-F19B-12E5-4B54-81E87DE34CD5}"/>
+              </a:ext>
+            </a:extLst>
+          </p:cNvPr>
+          <p:cNvSpPr txBox="1">
+            <a:spLocks noGrp="1"/>
+          </p:cNvSpPr>
+          <p:nvPr>
+            <p:ph type="sldNum" sz="quarter" idx="5"/>
+          </p:nvPr>
+        </p:nvSpPr>
+        <p:spPr>
+          <a:ln/>
+        </p:spPr>
+        <p:txBody>
+          <a:bodyPr lIns="0" tIns="0" rIns="0" bIns="0" anchor="b">
+            <a:noAutofit/>
+          </a:bodyPr>
+          <a:lstStyle/>
+          <a:p>
+            <a:pPr lvl="0"/>
             <a:fld id="{4D4BCF0C-1DBB-F742-8B0F-287B90803943}" type="slidenum">
-              <a:t>63</a:t>
+              <a:t>64</a:t>
             </a:fld>
             <a:endParaRPr lang="en-US"/>
           </a:p>
@@ -46588,6 +46715,156 @@
 
 <file path=ppt/slides/slide57.xml><?xml version="1.0" encoding="utf-8"?>
 <p:sld xmlns:a="http://schemas.openxmlformats.org/drawingml/2006/main" xmlns:r="http://schemas.openxmlformats.org/officeDocument/2006/relationships" xmlns:p="http://schemas.openxmlformats.org/presentationml/2006/main">
+  <p:cSld>
+    <p:spTree>
+      <p:nvGrpSpPr>
+        <p:cNvPr id="1" name="">
+          <a:extLst>
+            <a:ext uri="{FF2B5EF4-FFF2-40B4-BE49-F238E27FC236}">
+              <a16:creationId xmlns:a16="http://schemas.microsoft.com/office/drawing/2014/main" id="{D87AA414-BC84-F69A-6FBC-105AD4F2D303}"/>
+            </a:ext>
+          </a:extLst>
+        </p:cNvPr>
+        <p:cNvGrpSpPr/>
+        <p:nvPr/>
+      </p:nvGrpSpPr>
+      <p:grpSpPr>
+        <a:xfrm>
+          <a:off x="0" y="0"/>
+          <a:ext cx="0" cy="0"/>
+          <a:chOff x="0" y="0"/>
+          <a:chExt cx="0" cy="0"/>
+        </a:xfrm>
+      </p:grpSpPr>
+      <p:sp>
+        <p:nvSpPr>
+          <p:cNvPr id="2" name="Title 1">
+            <a:extLst>
+              <a:ext uri="{FF2B5EF4-FFF2-40B4-BE49-F238E27FC236}">
+                <a16:creationId xmlns:a16="http://schemas.microsoft.com/office/drawing/2014/main" id="{C786E882-F8CE-B564-36F6-65BB94FE9DA0}"/>
+              </a:ext>
+            </a:extLst>
+          </p:cNvPr>
+          <p:cNvSpPr txBox="1">
+            <a:spLocks noGrp="1"/>
+          </p:cNvSpPr>
+          <p:nvPr>
+            <p:ph type="title" idx="4294967295"/>
+          </p:nvPr>
+        </p:nvSpPr>
+        <p:spPr/>
+        <p:txBody>
+          <a:bodyPr/>
+          <a:lstStyle/>
+          <a:p>
+            <a:pPr lvl="0"/>
+            <a:r>
+              <a:rPr lang="en-US" dirty="0"/>
+              <a:t>Poll</a:t>
+            </a:r>
+          </a:p>
+        </p:txBody>
+      </p:sp>
+      <p:sp>
+        <p:nvSpPr>
+          <p:cNvPr id="3" name="Text Placeholder 2">
+            <a:extLst>
+              <a:ext uri="{FF2B5EF4-FFF2-40B4-BE49-F238E27FC236}">
+                <a16:creationId xmlns:a16="http://schemas.microsoft.com/office/drawing/2014/main" id="{B03DC98F-EDB7-421A-CC4E-B903F5757407}"/>
+              </a:ext>
+            </a:extLst>
+          </p:cNvPr>
+          <p:cNvSpPr txBox="1">
+            <a:spLocks noGrp="1"/>
+          </p:cNvSpPr>
+          <p:nvPr>
+            <p:ph type="body" idx="4294967295"/>
+          </p:nvPr>
+        </p:nvSpPr>
+        <p:spPr>
+          <a:xfrm>
+            <a:off x="503999" y="1769040"/>
+            <a:ext cx="9071640" cy="5088960"/>
+          </a:xfrm>
+        </p:spPr>
+        <p:txBody>
+          <a:bodyPr>
+            <a:normAutofit/>
+          </a:bodyPr>
+          <a:lstStyle/>
+          <a:p>
+            <a:pPr lvl="0">
+              <a:buSzPct val="100000"/>
+            </a:pPr>
+            <a:r>
+              <a:rPr lang="en-US" sz="2400" dirty="0">
+                <a:solidFill>
+                  <a:schemeClr val="accent6">
+                    <a:lumMod val="75000"/>
+                  </a:schemeClr>
+                </a:solidFill>
+                <a:latin typeface="FiraMono Nerd Font Mono" panose="020B0509050000020004" pitchFamily="49" charset="0"/>
+                <a:ea typeface="FiraMono Nerd Font Mono" panose="020B0509050000020004" pitchFamily="49" charset="0"/>
+              </a:rPr>
+              <a:t> </a:t>
+            </a:r>
+            <a:endParaRPr lang="en-US" sz="2600" dirty="0">
+              <a:solidFill>
+                <a:schemeClr val="accent6">
+                  <a:lumMod val="75000"/>
+                </a:schemeClr>
+              </a:solidFill>
+              <a:latin typeface="FiraMono Nerd Font Mono" panose="020B0509050000020004" pitchFamily="49" charset="0"/>
+              <a:ea typeface="FiraMono Nerd Font Mono" panose="020B0509050000020004" pitchFamily="49" charset="0"/>
+            </a:endParaRPr>
+          </a:p>
+        </p:txBody>
+      </p:sp>
+      <p:pic>
+        <p:nvPicPr>
+          <p:cNvPr id="4" name="Picture 3">
+            <a:extLst>
+              <a:ext uri="{FF2B5EF4-FFF2-40B4-BE49-F238E27FC236}">
+                <a16:creationId xmlns:a16="http://schemas.microsoft.com/office/drawing/2014/main" id="{2E0679AA-58C0-0DF2-C16C-E541400F23CB}"/>
+              </a:ext>
+            </a:extLst>
+          </p:cNvPr>
+          <p:cNvPicPr>
+            <a:picLocks noChangeAspect="1"/>
+          </p:cNvPicPr>
+          <p:nvPr/>
+        </p:nvPicPr>
+        <p:blipFill>
+          <a:blip r:embed="rId3"/>
+          <a:stretch>
+            <a:fillRect/>
+          </a:stretch>
+        </p:blipFill>
+        <p:spPr>
+          <a:xfrm>
+            <a:off x="6944809" y="4413068"/>
+            <a:ext cx="2543556" cy="2543556"/>
+          </a:xfrm>
+          <a:prstGeom prst="rect">
+            <a:avLst/>
+          </a:prstGeom>
+        </p:spPr>
+      </p:pic>
+    </p:spTree>
+    <p:extLst>
+      <p:ext uri="{BB962C8B-B14F-4D97-AF65-F5344CB8AC3E}">
+        <p14:creationId xmlns:p14="http://schemas.microsoft.com/office/powerpoint/2010/main" val="1001956731"/>
+      </p:ext>
+    </p:extLst>
+  </p:cSld>
+  <p:clrMapOvr>
+    <a:masterClrMapping/>
+  </p:clrMapOvr>
+</p:sld>
+</file>
+
+<file path=ppt/slides/slide58.xml><?xml version="1.0" encoding="utf-8"?>
+<p:sld xmlns:a="http://schemas.openxmlformats.org/drawingml/2006/main" xmlns:r="http://schemas.openxmlformats.org/officeDocument/2006/relationships" xmlns:p="http://schemas.openxmlformats.org/presentationml/2006/main">
   <p:cSld name="page58">
     <p:spTree>
       <p:nvGrpSpPr>
@@ -46645,7 +46922,7 @@
 </p:sld>
 </file>
 
-<file path=ppt/slides/slide58.xml><?xml version="1.0" encoding="utf-8"?>
+<file path=ppt/slides/slide59.xml><?xml version="1.0" encoding="utf-8"?>
 <p:sld xmlns:a="http://schemas.openxmlformats.org/drawingml/2006/main" xmlns:r="http://schemas.openxmlformats.org/officeDocument/2006/relationships" xmlns:p="http://schemas.openxmlformats.org/presentationml/2006/main">
   <p:cSld name="page59">
     <p:spTree>
@@ -46774,154 +47051,6 @@
               <a:buChar char="•"/>
             </a:pPr>
             <a:endParaRPr lang="en-US" dirty="0"/>
-          </a:p>
-        </p:txBody>
-      </p:sp>
-    </p:spTree>
-  </p:cSld>
-  <p:clrMapOvr>
-    <a:masterClrMapping/>
-  </p:clrMapOvr>
-</p:sld>
-</file>
-
-<file path=ppt/slides/slide59.xml><?xml version="1.0" encoding="utf-8"?>
-<p:sld xmlns:a="http://schemas.openxmlformats.org/drawingml/2006/main" xmlns:r="http://schemas.openxmlformats.org/officeDocument/2006/relationships" xmlns:p="http://schemas.openxmlformats.org/presentationml/2006/main">
-  <p:cSld name="page60">
-    <p:spTree>
-      <p:nvGrpSpPr>
-        <p:cNvPr id="1" name=""/>
-        <p:cNvGrpSpPr/>
-        <p:nvPr/>
-      </p:nvGrpSpPr>
-      <p:grpSpPr>
-        <a:xfrm>
-          <a:off x="0" y="0"/>
-          <a:ext cx="0" cy="0"/>
-          <a:chOff x="0" y="0"/>
-          <a:chExt cx="0" cy="0"/>
-        </a:xfrm>
-      </p:grpSpPr>
-      <p:sp>
-        <p:nvSpPr>
-          <p:cNvPr id="2" name="Title 1">
-            <a:extLst>
-              <a:ext uri="{FF2B5EF4-FFF2-40B4-BE49-F238E27FC236}">
-                <a16:creationId xmlns:a16="http://schemas.microsoft.com/office/drawing/2014/main" id="{8C488D68-6BB9-7F65-F334-9FEC31DFAABC}"/>
-              </a:ext>
-            </a:extLst>
-          </p:cNvPr>
-          <p:cNvSpPr txBox="1">
-            <a:spLocks noGrp="1"/>
-          </p:cNvSpPr>
-          <p:nvPr>
-            <p:ph type="title" idx="4294967295"/>
-          </p:nvPr>
-        </p:nvSpPr>
-        <p:spPr/>
-        <p:txBody>
-          <a:bodyPr/>
-          <a:lstStyle/>
-          <a:p>
-            <a:pPr lvl="0"/>
-            <a:r>
-              <a:rPr lang="en-US"/>
-              <a:t>Saving register state across invocations</a:t>
-            </a:r>
-          </a:p>
-        </p:txBody>
-      </p:sp>
-      <p:sp>
-        <p:nvSpPr>
-          <p:cNvPr id="3" name="Text Placeholder 2">
-            <a:extLst>
-              <a:ext uri="{FF2B5EF4-FFF2-40B4-BE49-F238E27FC236}">
-                <a16:creationId xmlns:a16="http://schemas.microsoft.com/office/drawing/2014/main" id="{E7D09695-C09E-578B-C4AC-37D28C2D12C5}"/>
-              </a:ext>
-            </a:extLst>
-          </p:cNvPr>
-          <p:cNvSpPr txBox="1">
-            <a:spLocks noGrp="1"/>
-          </p:cNvSpPr>
-          <p:nvPr>
-            <p:ph type="body" idx="4294967295"/>
-          </p:nvPr>
-        </p:nvSpPr>
-        <p:spPr/>
-        <p:txBody>
-          <a:bodyPr/>
-          <a:lstStyle/>
-          <a:p>
-            <a:pPr marL="457200" lvl="0" indent="-457200">
-              <a:buSzPct val="100000"/>
-              <a:buFont typeface="Arial" panose="020B0604020202020204" pitchFamily="34" charset="0"/>
-              <a:buChar char="•"/>
-            </a:pPr>
-            <a:r>
-              <a:rPr lang="en-US" dirty="0"/>
-              <a:t>Registers EAX, ECX, and EDX are </a:t>
-            </a:r>
-            <a:r>
-              <a:rPr lang="en-US" dirty="0">
-                <a:solidFill>
-                  <a:schemeClr val="accent4"/>
-                </a:solidFill>
-              </a:rPr>
-              <a:t>caller-saved</a:t>
-            </a:r>
-          </a:p>
-          <a:p>
-            <a:pPr marL="457200" lvl="1" indent="-457200" hangingPunct="0">
-              <a:spcBef>
-                <a:spcPts val="0"/>
-              </a:spcBef>
-              <a:spcAft>
-                <a:spcPts val="1414"/>
-              </a:spcAft>
-              <a:buSzPct val="100000"/>
-            </a:pPr>
-            <a:r>
-              <a:rPr lang="en-US" sz="3200" dirty="0">
-                <a:latin typeface="Liberation Sans" pitchFamily="18"/>
-              </a:rPr>
-              <a:t>The function is free to use them</a:t>
-            </a:r>
-          </a:p>
-          <a:p>
-            <a:pPr marL="457200" lvl="0" indent="-457200">
-              <a:buSzPct val="100000"/>
-              <a:buFont typeface="Arial" panose="020B0604020202020204" pitchFamily="34" charset="0"/>
-              <a:buChar char="•"/>
-            </a:pPr>
-            <a:r>
-              <a:rPr lang="en-US" dirty="0"/>
-              <a:t>... the rest are </a:t>
-            </a:r>
-            <a:r>
-              <a:rPr lang="en-US" dirty="0">
-                <a:solidFill>
-                  <a:schemeClr val="accent4"/>
-                </a:solidFill>
-              </a:rPr>
-              <a:t>callee-saved</a:t>
-            </a:r>
-          </a:p>
-          <a:p>
-            <a:pPr marL="457200" lvl="1" indent="-457200" hangingPunct="0">
-              <a:spcBef>
-                <a:spcPts val="0"/>
-              </a:spcBef>
-              <a:spcAft>
-                <a:spcPts val="1414"/>
-              </a:spcAft>
-              <a:buSzPct val="100000"/>
-            </a:pPr>
-            <a:r>
-              <a:rPr lang="en-US" sz="3200" dirty="0">
-                <a:latin typeface="Liberation Sans" pitchFamily="18"/>
-              </a:rPr>
-              <a:t>If the function uses them it has to restore them to the original values</a:t>
-            </a:r>
           </a:p>
         </p:txBody>
       </p:sp>
@@ -47388,6 +47517,154 @@
 
 <file path=ppt/slides/slide60.xml><?xml version="1.0" encoding="utf-8"?>
 <p:sld xmlns:a="http://schemas.openxmlformats.org/drawingml/2006/main" xmlns:r="http://schemas.openxmlformats.org/officeDocument/2006/relationships" xmlns:p="http://schemas.openxmlformats.org/presentationml/2006/main">
+  <p:cSld name="page60">
+    <p:spTree>
+      <p:nvGrpSpPr>
+        <p:cNvPr id="1" name=""/>
+        <p:cNvGrpSpPr/>
+        <p:nvPr/>
+      </p:nvGrpSpPr>
+      <p:grpSpPr>
+        <a:xfrm>
+          <a:off x="0" y="0"/>
+          <a:ext cx="0" cy="0"/>
+          <a:chOff x="0" y="0"/>
+          <a:chExt cx="0" cy="0"/>
+        </a:xfrm>
+      </p:grpSpPr>
+      <p:sp>
+        <p:nvSpPr>
+          <p:cNvPr id="2" name="Title 1">
+            <a:extLst>
+              <a:ext uri="{FF2B5EF4-FFF2-40B4-BE49-F238E27FC236}">
+                <a16:creationId xmlns:a16="http://schemas.microsoft.com/office/drawing/2014/main" id="{8C488D68-6BB9-7F65-F334-9FEC31DFAABC}"/>
+              </a:ext>
+            </a:extLst>
+          </p:cNvPr>
+          <p:cNvSpPr txBox="1">
+            <a:spLocks noGrp="1"/>
+          </p:cNvSpPr>
+          <p:nvPr>
+            <p:ph type="title" idx="4294967295"/>
+          </p:nvPr>
+        </p:nvSpPr>
+        <p:spPr/>
+        <p:txBody>
+          <a:bodyPr/>
+          <a:lstStyle/>
+          <a:p>
+            <a:pPr lvl="0"/>
+            <a:r>
+              <a:rPr lang="en-US"/>
+              <a:t>Saving register state across invocations</a:t>
+            </a:r>
+          </a:p>
+        </p:txBody>
+      </p:sp>
+      <p:sp>
+        <p:nvSpPr>
+          <p:cNvPr id="3" name="Text Placeholder 2">
+            <a:extLst>
+              <a:ext uri="{FF2B5EF4-FFF2-40B4-BE49-F238E27FC236}">
+                <a16:creationId xmlns:a16="http://schemas.microsoft.com/office/drawing/2014/main" id="{E7D09695-C09E-578B-C4AC-37D28C2D12C5}"/>
+              </a:ext>
+            </a:extLst>
+          </p:cNvPr>
+          <p:cNvSpPr txBox="1">
+            <a:spLocks noGrp="1"/>
+          </p:cNvSpPr>
+          <p:nvPr>
+            <p:ph type="body" idx="4294967295"/>
+          </p:nvPr>
+        </p:nvSpPr>
+        <p:spPr/>
+        <p:txBody>
+          <a:bodyPr/>
+          <a:lstStyle/>
+          <a:p>
+            <a:pPr marL="457200" lvl="0" indent="-457200">
+              <a:buSzPct val="100000"/>
+              <a:buFont typeface="Arial" panose="020B0604020202020204" pitchFamily="34" charset="0"/>
+              <a:buChar char="•"/>
+            </a:pPr>
+            <a:r>
+              <a:rPr lang="en-US" dirty="0"/>
+              <a:t>Registers EAX, ECX, and EDX are </a:t>
+            </a:r>
+            <a:r>
+              <a:rPr lang="en-US" dirty="0">
+                <a:solidFill>
+                  <a:schemeClr val="accent4"/>
+                </a:solidFill>
+              </a:rPr>
+              <a:t>caller-saved</a:t>
+            </a:r>
+          </a:p>
+          <a:p>
+            <a:pPr marL="457200" lvl="1" indent="-457200" hangingPunct="0">
+              <a:spcBef>
+                <a:spcPts val="0"/>
+              </a:spcBef>
+              <a:spcAft>
+                <a:spcPts val="1414"/>
+              </a:spcAft>
+              <a:buSzPct val="100000"/>
+            </a:pPr>
+            <a:r>
+              <a:rPr lang="en-US" sz="3200" dirty="0">
+                <a:latin typeface="Liberation Sans" pitchFamily="18"/>
+              </a:rPr>
+              <a:t>The function is free to use them</a:t>
+            </a:r>
+          </a:p>
+          <a:p>
+            <a:pPr marL="457200" lvl="0" indent="-457200">
+              <a:buSzPct val="100000"/>
+              <a:buFont typeface="Arial" panose="020B0604020202020204" pitchFamily="34" charset="0"/>
+              <a:buChar char="•"/>
+            </a:pPr>
+            <a:r>
+              <a:rPr lang="en-US" dirty="0"/>
+              <a:t>... the rest are </a:t>
+            </a:r>
+            <a:r>
+              <a:rPr lang="en-US" dirty="0">
+                <a:solidFill>
+                  <a:schemeClr val="accent4"/>
+                </a:solidFill>
+              </a:rPr>
+              <a:t>callee-saved</a:t>
+            </a:r>
+          </a:p>
+          <a:p>
+            <a:pPr marL="457200" lvl="1" indent="-457200" hangingPunct="0">
+              <a:spcBef>
+                <a:spcPts val="0"/>
+              </a:spcBef>
+              <a:spcAft>
+                <a:spcPts val="1414"/>
+              </a:spcAft>
+              <a:buSzPct val="100000"/>
+            </a:pPr>
+            <a:r>
+              <a:rPr lang="en-US" sz="3200" dirty="0">
+                <a:latin typeface="Liberation Sans" pitchFamily="18"/>
+              </a:rPr>
+              <a:t>If the function uses them it has to restore them to the original values</a:t>
+            </a:r>
+          </a:p>
+        </p:txBody>
+      </p:sp>
+    </p:spTree>
+  </p:cSld>
+  <p:clrMapOvr>
+    <a:masterClrMapping/>
+  </p:clrMapOvr>
+</p:sld>
+</file>
+
+<file path=ppt/slides/slide61.xml><?xml version="1.0" encoding="utf-8"?>
+<p:sld xmlns:a="http://schemas.openxmlformats.org/drawingml/2006/main" xmlns:r="http://schemas.openxmlformats.org/officeDocument/2006/relationships" xmlns:p="http://schemas.openxmlformats.org/presentationml/2006/main">
   <p:cSld name="page61">
     <p:spTree>
       <p:nvGrpSpPr>
@@ -47568,7 +47845,7 @@
 </p:sld>
 </file>
 
-<file path=ppt/slides/slide61.xml><?xml version="1.0" encoding="utf-8"?>
+<file path=ppt/slides/slide62.xml><?xml version="1.0" encoding="utf-8"?>
 <p:sld xmlns:a="http://schemas.openxmlformats.org/drawingml/2006/main" xmlns:r="http://schemas.openxmlformats.org/officeDocument/2006/relationships" xmlns:p="http://schemas.openxmlformats.org/presentationml/2006/main">
   <p:cSld name="page62">
     <p:spTree>
@@ -48141,7 +48418,7 @@
 </p:sld>
 </file>
 
-<file path=ppt/slides/slide62.xml><?xml version="1.0" encoding="utf-8"?>
+<file path=ppt/slides/slide63.xml><?xml version="1.0" encoding="utf-8"?>
 <p:sld xmlns:a="http://schemas.openxmlformats.org/drawingml/2006/main" xmlns:r="http://schemas.openxmlformats.org/officeDocument/2006/relationships" xmlns:p="http://schemas.openxmlformats.org/presentationml/2006/main">
   <p:cSld name="page63">
     <p:spTree>
@@ -48200,7 +48477,7 @@
 </p:sld>
 </file>
 
-<file path=ppt/slides/slide63.xml><?xml version="1.0" encoding="utf-8"?>
+<file path=ppt/slides/slide64.xml><?xml version="1.0" encoding="utf-8"?>
 <p:sld xmlns:a="http://schemas.openxmlformats.org/drawingml/2006/main" xmlns:r="http://schemas.openxmlformats.org/officeDocument/2006/relationships" xmlns:p="http://schemas.openxmlformats.org/presentationml/2006/main">
   <p:cSld name="page64">
     <p:spTree>

</xml_diff>